<commit_message>
add my part on pp
</commit_message>
<xml_diff>
--- a/SnakeBitePresentation_cfoEdits2.pptx
+++ b/SnakeBitePresentation_cfoEdits2.pptx
@@ -8,9 +8,9 @@
     <p:sldId id="256" r:id="rId2"/>
     <p:sldId id="257" r:id="rId3"/>
     <p:sldId id="267" r:id="rId4"/>
-    <p:sldId id="266" r:id="rId5"/>
-    <p:sldId id="269" r:id="rId6"/>
-    <p:sldId id="268" r:id="rId7"/>
+    <p:sldId id="268" r:id="rId5"/>
+    <p:sldId id="266" r:id="rId6"/>
+    <p:sldId id="269" r:id="rId7"/>
     <p:sldId id="258" r:id="rId8"/>
     <p:sldId id="259" r:id="rId9"/>
     <p:sldId id="260" r:id="rId10"/>
@@ -846,7 +846,7 @@
           <a:p>
             <a:fld id="{8CC71C08-3195-43D4-9A1F-6CFC67AEC340}" type="datetimeFigureOut">
               <a:rPr lang="en-US" smtClean="0"/>
-              <a:t>3/2/2019</a:t>
+              <a:t>3/3/19</a:t>
             </a:fld>
             <a:endParaRPr lang="en-US"/>
           </a:p>
@@ -1097,7 +1097,7 @@
           <a:p>
             <a:fld id="{8CC71C08-3195-43D4-9A1F-6CFC67AEC340}" type="datetimeFigureOut">
               <a:rPr lang="en-US" smtClean="0"/>
-              <a:t>3/2/2019</a:t>
+              <a:t>3/3/19</a:t>
             </a:fld>
             <a:endParaRPr lang="en-US"/>
           </a:p>
@@ -1411,7 +1411,7 @@
           <a:p>
             <a:fld id="{8CC71C08-3195-43D4-9A1F-6CFC67AEC340}" type="datetimeFigureOut">
               <a:rPr lang="en-US" smtClean="0"/>
-              <a:t>3/2/2019</a:t>
+              <a:t>3/3/19</a:t>
             </a:fld>
             <a:endParaRPr lang="en-US"/>
           </a:p>
@@ -1752,7 +1752,7 @@
           <a:p>
             <a:fld id="{8CC71C08-3195-43D4-9A1F-6CFC67AEC340}" type="datetimeFigureOut">
               <a:rPr lang="en-US" smtClean="0"/>
-              <a:t>3/2/2019</a:t>
+              <a:t>3/3/19</a:t>
             </a:fld>
             <a:endParaRPr lang="en-US"/>
           </a:p>
@@ -2066,7 +2066,7 @@
           <a:p>
             <a:fld id="{8CC71C08-3195-43D4-9A1F-6CFC67AEC340}" type="datetimeFigureOut">
               <a:rPr lang="en-US" smtClean="0"/>
-              <a:t>3/2/2019</a:t>
+              <a:t>3/3/19</a:t>
             </a:fld>
             <a:endParaRPr lang="en-US"/>
           </a:p>
@@ -2459,7 +2459,7 @@
           <a:p>
             <a:fld id="{8CC71C08-3195-43D4-9A1F-6CFC67AEC340}" type="datetimeFigureOut">
               <a:rPr lang="en-US" smtClean="0"/>
-              <a:t>3/2/2019</a:t>
+              <a:t>3/3/19</a:t>
             </a:fld>
             <a:endParaRPr lang="en-US"/>
           </a:p>
@@ -2629,7 +2629,7 @@
           <a:p>
             <a:fld id="{8CC71C08-3195-43D4-9A1F-6CFC67AEC340}" type="datetimeFigureOut">
               <a:rPr lang="en-US" smtClean="0"/>
-              <a:t>3/2/2019</a:t>
+              <a:t>3/3/19</a:t>
             </a:fld>
             <a:endParaRPr lang="en-US"/>
           </a:p>
@@ -2809,7 +2809,7 @@
           <a:p>
             <a:fld id="{8CC71C08-3195-43D4-9A1F-6CFC67AEC340}" type="datetimeFigureOut">
               <a:rPr lang="en-US" smtClean="0"/>
-              <a:t>3/2/2019</a:t>
+              <a:t>3/3/19</a:t>
             </a:fld>
             <a:endParaRPr lang="en-US"/>
           </a:p>
@@ -2985,7 +2985,7 @@
           <a:p>
             <a:fld id="{8CC71C08-3195-43D4-9A1F-6CFC67AEC340}" type="datetimeFigureOut">
               <a:rPr lang="en-US" smtClean="0"/>
-              <a:t>3/2/2019</a:t>
+              <a:t>3/3/19</a:t>
             </a:fld>
             <a:endParaRPr lang="en-US"/>
           </a:p>
@@ -3232,7 +3232,7 @@
           <a:p>
             <a:fld id="{8CC71C08-3195-43D4-9A1F-6CFC67AEC340}" type="datetimeFigureOut">
               <a:rPr lang="en-US" smtClean="0"/>
-              <a:t>3/2/2019</a:t>
+              <a:t>3/3/19</a:t>
             </a:fld>
             <a:endParaRPr lang="en-US"/>
           </a:p>
@@ -3464,7 +3464,7 @@
           <a:p>
             <a:fld id="{8CC71C08-3195-43D4-9A1F-6CFC67AEC340}" type="datetimeFigureOut">
               <a:rPr lang="en-US" smtClean="0"/>
-              <a:t>3/2/2019</a:t>
+              <a:t>3/3/19</a:t>
             </a:fld>
             <a:endParaRPr lang="en-US"/>
           </a:p>
@@ -3838,7 +3838,7 @@
           <a:p>
             <a:fld id="{8CC71C08-3195-43D4-9A1F-6CFC67AEC340}" type="datetimeFigureOut">
               <a:rPr lang="en-US" smtClean="0"/>
-              <a:t>3/2/2019</a:t>
+              <a:t>3/3/19</a:t>
             </a:fld>
             <a:endParaRPr lang="en-US"/>
           </a:p>
@@ -3961,7 +3961,7 @@
           <a:p>
             <a:fld id="{8CC71C08-3195-43D4-9A1F-6CFC67AEC340}" type="datetimeFigureOut">
               <a:rPr lang="en-US" smtClean="0"/>
-              <a:t>3/2/2019</a:t>
+              <a:t>3/3/19</a:t>
             </a:fld>
             <a:endParaRPr lang="en-US"/>
           </a:p>
@@ -4056,7 +4056,7 @@
           <a:p>
             <a:fld id="{8CC71C08-3195-43D4-9A1F-6CFC67AEC340}" type="datetimeFigureOut">
               <a:rPr lang="en-US" smtClean="0"/>
-              <a:t>3/2/2019</a:t>
+              <a:t>3/3/19</a:t>
             </a:fld>
             <a:endParaRPr lang="en-US"/>
           </a:p>
@@ -4311,7 +4311,7 @@
           <a:p>
             <a:fld id="{8CC71C08-3195-43D4-9A1F-6CFC67AEC340}" type="datetimeFigureOut">
               <a:rPr lang="en-US" smtClean="0"/>
-              <a:t>3/2/2019</a:t>
+              <a:t>3/3/19</a:t>
             </a:fld>
             <a:endParaRPr lang="en-US"/>
           </a:p>
@@ -4574,7 +4574,7 @@
           <a:p>
             <a:fld id="{8CC71C08-3195-43D4-9A1F-6CFC67AEC340}" type="datetimeFigureOut">
               <a:rPr lang="en-US" smtClean="0"/>
-              <a:t>3/2/2019</a:t>
+              <a:t>3/3/19</a:t>
             </a:fld>
             <a:endParaRPr lang="en-US"/>
           </a:p>
@@ -5317,7 +5317,7 @@
           <a:p>
             <a:fld id="{8CC71C08-3195-43D4-9A1F-6CFC67AEC340}" type="datetimeFigureOut">
               <a:rPr lang="en-US" smtClean="0"/>
-              <a:t>3/2/2019</a:t>
+              <a:t>3/3/19</a:t>
             </a:fld>
             <a:endParaRPr lang="en-US"/>
           </a:p>
@@ -8303,6 +8303,195 @@
           <p:cNvPr id="2" name="Title 1">
             <a:extLst>
               <a:ext uri="{FF2B5EF4-FFF2-40B4-BE49-F238E27FC236}">
+                <a16:creationId xmlns:a16="http://schemas.microsoft.com/office/drawing/2014/main" id="{8FA609FA-2602-460C-B86A-36EF1C8E1ED8}"/>
+              </a:ext>
+            </a:extLst>
+          </p:cNvPr>
+          <p:cNvSpPr>
+            <a:spLocks noGrp="1"/>
+          </p:cNvSpPr>
+          <p:nvPr>
+            <p:ph type="title"/>
+          </p:nvPr>
+        </p:nvSpPr>
+        <p:spPr/>
+        <p:txBody>
+          <a:bodyPr/>
+          <a:lstStyle/>
+          <a:p>
+            <a:pPr algn="ctr"/>
+            <a:r>
+              <a:rPr lang="en-US" dirty="0">
+                <a:latin typeface="Calibri" panose="020F0502020204030204" pitchFamily="34" charset="0"/>
+                <a:cs typeface="Calibri" panose="020F0502020204030204" pitchFamily="34" charset="0"/>
+              </a:rPr>
+              <a:t>Data Cleaning</a:t>
+            </a:r>
+          </a:p>
+        </p:txBody>
+      </p:sp>
+      <p:sp>
+        <p:nvSpPr>
+          <p:cNvPr id="3" name="Content Placeholder 2">
+            <a:extLst>
+              <a:ext uri="{FF2B5EF4-FFF2-40B4-BE49-F238E27FC236}">
+                <a16:creationId xmlns:a16="http://schemas.microsoft.com/office/drawing/2014/main" id="{912ACEB9-2452-4739-BDD4-C3D9D781E28A}"/>
+              </a:ext>
+            </a:extLst>
+          </p:cNvPr>
+          <p:cNvSpPr>
+            <a:spLocks noGrp="1"/>
+          </p:cNvSpPr>
+          <p:nvPr>
+            <p:ph idx="1"/>
+          </p:nvPr>
+        </p:nvSpPr>
+        <p:spPr/>
+        <p:txBody>
+          <a:bodyPr/>
+          <a:lstStyle/>
+          <a:p>
+            <a:r>
+              <a:rPr lang="en-US" dirty="0">
+                <a:cs typeface="Calibri" panose="020F0502020204030204" pitchFamily="34" charset="0"/>
+              </a:rPr>
+              <a:t>80% of data analysis process is data cleaning</a:t>
+            </a:r>
+            <a:endParaRPr lang="en-US" dirty="0"/>
+          </a:p>
+          <a:p>
+            <a:r>
+              <a:rPr lang="en-US" dirty="0"/>
+              <a:t>Ignoring missing values vs filling reasonable numbers:</a:t>
+            </a:r>
+          </a:p>
+          <a:p>
+            <a:pPr lvl="1"/>
+            <a:r>
+              <a:rPr lang="en-US" dirty="0" err="1"/>
+              <a:t>DataFrame.dropna</a:t>
+            </a:r>
+            <a:r>
+              <a:rPr lang="en-US" dirty="0"/>
+              <a:t> = lose accuracy</a:t>
+            </a:r>
+          </a:p>
+          <a:p>
+            <a:pPr lvl="1"/>
+            <a:r>
+              <a:rPr lang="en-US" dirty="0"/>
+              <a:t>Create your own function</a:t>
+            </a:r>
+          </a:p>
+          <a:p>
+            <a:pPr lvl="1"/>
+            <a:r>
+              <a:rPr lang="en-US" dirty="0"/>
+              <a:t>Lambda function</a:t>
+            </a:r>
+          </a:p>
+          <a:p>
+            <a:pPr lvl="2"/>
+            <a:r>
+              <a:rPr lang="en-US" dirty="0"/>
+              <a:t>I. e. </a:t>
+            </a:r>
+            <a:r>
+              <a:rPr lang="en-US" dirty="0" err="1"/>
+              <a:t>df</a:t>
+            </a:r>
+            <a:r>
+              <a:rPr lang="en-US" dirty="0"/>
+              <a:t>[‘Score’].apply(lambda x: </a:t>
+            </a:r>
+            <a:r>
+              <a:rPr lang="en-US" dirty="0" err="1"/>
+              <a:t>x.fillna</a:t>
+            </a:r>
+            <a:r>
+              <a:rPr lang="en-US" dirty="0"/>
+              <a:t>(</a:t>
+            </a:r>
+            <a:r>
+              <a:rPr lang="en-US" dirty="0" err="1"/>
+              <a:t>x.mean</a:t>
+            </a:r>
+            <a:r>
+              <a:rPr lang="en-US" dirty="0"/>
+              <a:t>()),axis=1)</a:t>
+            </a:r>
+          </a:p>
+          <a:p>
+            <a:r>
+              <a:rPr lang="en-US" dirty="0"/>
+              <a:t>Normalizing data (rescaling or standardizing)</a:t>
+            </a:r>
+          </a:p>
+          <a:p>
+            <a:pPr lvl="1"/>
+            <a:r>
+              <a:rPr lang="en-US" dirty="0" err="1"/>
+              <a:t>dfA</a:t>
+            </a:r>
+            <a:r>
+              <a:rPr lang="en-US" dirty="0"/>
+              <a:t> score range: 0 to 30</a:t>
+            </a:r>
+          </a:p>
+          <a:p>
+            <a:pPr lvl="1"/>
+            <a:r>
+              <a:rPr lang="en-US" dirty="0" err="1"/>
+              <a:t>dfB</a:t>
+            </a:r>
+            <a:r>
+              <a:rPr lang="en-US"/>
+              <a:t> score range: -30 to 50</a:t>
+            </a:r>
+          </a:p>
+          <a:p>
+            <a:pPr marL="0" indent="0">
+              <a:buNone/>
+            </a:pPr>
+            <a:endParaRPr lang="en-US" dirty="0"/>
+          </a:p>
+        </p:txBody>
+      </p:sp>
+    </p:spTree>
+    <p:extLst>
+      <p:ext uri="{BB962C8B-B14F-4D97-AF65-F5344CB8AC3E}">
+        <p14:creationId xmlns:p14="http://schemas.microsoft.com/office/powerpoint/2010/main" val="3722343492"/>
+      </p:ext>
+    </p:extLst>
+  </p:cSld>
+  <p:clrMapOvr>
+    <a:masterClrMapping/>
+  </p:clrMapOvr>
+</p:sld>
+</file>
+
+<file path=ppt/slides/slide5.xml><?xml version="1.0" encoding="utf-8"?>
+<p:sld xmlns:a="http://schemas.openxmlformats.org/drawingml/2006/main" xmlns:r="http://schemas.openxmlformats.org/officeDocument/2006/relationships" xmlns:p="http://schemas.openxmlformats.org/presentationml/2006/main">
+  <p:cSld>
+    <p:spTree>
+      <p:nvGrpSpPr>
+        <p:cNvPr id="1" name=""/>
+        <p:cNvGrpSpPr/>
+        <p:nvPr/>
+      </p:nvGrpSpPr>
+      <p:grpSpPr>
+        <a:xfrm>
+          <a:off x="0" y="0"/>
+          <a:ext cx="0" cy="0"/>
+          <a:chOff x="0" y="0"/>
+          <a:chExt cx="0" cy="0"/>
+        </a:xfrm>
+      </p:grpSpPr>
+      <p:sp>
+        <p:nvSpPr>
+          <p:cNvPr id="2" name="Title 1">
+            <a:extLst>
+              <a:ext uri="{FF2B5EF4-FFF2-40B4-BE49-F238E27FC236}">
                 <a16:creationId xmlns:a16="http://schemas.microsoft.com/office/drawing/2014/main" id="{58047559-5EC1-43D8-8F94-23869C87ED6A}"/>
               </a:ext>
             </a:extLst>
@@ -8485,7 +8674,7 @@
 </p:sld>
 </file>
 
-<file path=ppt/slides/slide5.xml><?xml version="1.0" encoding="utf-8"?>
+<file path=ppt/slides/slide6.xml><?xml version="1.0" encoding="utf-8"?>
 <p:sld xmlns:a="http://schemas.openxmlformats.org/drawingml/2006/main" xmlns:r="http://schemas.openxmlformats.org/officeDocument/2006/relationships" xmlns:p="http://schemas.openxmlformats.org/presentationml/2006/main">
   <p:cSld>
     <p:bg>
@@ -10467,92 +10656,6 @@
     <p:extLst>
       <p:ext uri="{BB962C8B-B14F-4D97-AF65-F5344CB8AC3E}">
         <p14:creationId xmlns:p14="http://schemas.microsoft.com/office/powerpoint/2010/main" val="644430293"/>
-      </p:ext>
-    </p:extLst>
-  </p:cSld>
-  <p:clrMapOvr>
-    <a:masterClrMapping/>
-  </p:clrMapOvr>
-</p:sld>
-</file>
-
-<file path=ppt/slides/slide6.xml><?xml version="1.0" encoding="utf-8"?>
-<p:sld xmlns:a="http://schemas.openxmlformats.org/drawingml/2006/main" xmlns:r="http://schemas.openxmlformats.org/officeDocument/2006/relationships" xmlns:p="http://schemas.openxmlformats.org/presentationml/2006/main">
-  <p:cSld>
-    <p:spTree>
-      <p:nvGrpSpPr>
-        <p:cNvPr id="1" name=""/>
-        <p:cNvGrpSpPr/>
-        <p:nvPr/>
-      </p:nvGrpSpPr>
-      <p:grpSpPr>
-        <a:xfrm>
-          <a:off x="0" y="0"/>
-          <a:ext cx="0" cy="0"/>
-          <a:chOff x="0" y="0"/>
-          <a:chExt cx="0" cy="0"/>
-        </a:xfrm>
-      </p:grpSpPr>
-      <p:sp>
-        <p:nvSpPr>
-          <p:cNvPr id="2" name="Title 1">
-            <a:extLst>
-              <a:ext uri="{FF2B5EF4-FFF2-40B4-BE49-F238E27FC236}">
-                <a16:creationId xmlns:a16="http://schemas.microsoft.com/office/drawing/2014/main" id="{8FA609FA-2602-460C-B86A-36EF1C8E1ED8}"/>
-              </a:ext>
-            </a:extLst>
-          </p:cNvPr>
-          <p:cNvSpPr>
-            <a:spLocks noGrp="1"/>
-          </p:cNvSpPr>
-          <p:nvPr>
-            <p:ph type="title"/>
-          </p:nvPr>
-        </p:nvSpPr>
-        <p:spPr/>
-        <p:txBody>
-          <a:bodyPr/>
-          <a:lstStyle/>
-          <a:p>
-            <a:r>
-              <a:rPr lang="en-US" dirty="0">
-                <a:latin typeface="Calibri" panose="020F0502020204030204" pitchFamily="34" charset="0"/>
-                <a:cs typeface="Calibri" panose="020F0502020204030204" pitchFamily="34" charset="0"/>
-              </a:rPr>
-              <a:t>The data cleaning saga continues…</a:t>
-            </a:r>
-          </a:p>
-        </p:txBody>
-      </p:sp>
-      <p:sp>
-        <p:nvSpPr>
-          <p:cNvPr id="3" name="Content Placeholder 2">
-            <a:extLst>
-              <a:ext uri="{FF2B5EF4-FFF2-40B4-BE49-F238E27FC236}">
-                <a16:creationId xmlns:a16="http://schemas.microsoft.com/office/drawing/2014/main" id="{912ACEB9-2452-4739-BDD4-C3D9D781E28A}"/>
-              </a:ext>
-            </a:extLst>
-          </p:cNvPr>
-          <p:cNvSpPr>
-            <a:spLocks noGrp="1"/>
-          </p:cNvSpPr>
-          <p:nvPr>
-            <p:ph idx="1"/>
-          </p:nvPr>
-        </p:nvSpPr>
-        <p:spPr/>
-        <p:txBody>
-          <a:bodyPr/>
-          <a:lstStyle/>
-          <a:p>
-            <a:endParaRPr lang="en-US" dirty="0"/>
-          </a:p>
-        </p:txBody>
-      </p:sp>
-    </p:spTree>
-    <p:extLst>
-      <p:ext uri="{BB962C8B-B14F-4D97-AF65-F5344CB8AC3E}">
-        <p14:creationId xmlns:p14="http://schemas.microsoft.com/office/powerpoint/2010/main" val="3722343492"/>
       </p:ext>
     </p:extLst>
   </p:cSld>

</xml_diff>

<commit_message>
add copy of sasha's file
</commit_message>
<xml_diff>
--- a/SnakeBitePresentation_cfoEdits2.pptx
+++ b/SnakeBitePresentation_cfoEdits2.pptx
@@ -13,12 +13,12 @@
     <p:sldId id="271" r:id="rId7"/>
     <p:sldId id="269" r:id="rId8"/>
     <p:sldId id="258" r:id="rId9"/>
-    <p:sldId id="259" r:id="rId10"/>
-    <p:sldId id="260" r:id="rId11"/>
-    <p:sldId id="270" r:id="rId12"/>
-    <p:sldId id="261" r:id="rId13"/>
-    <p:sldId id="262" r:id="rId14"/>
-    <p:sldId id="264" r:id="rId15"/>
+    <p:sldId id="260" r:id="rId10"/>
+    <p:sldId id="270" r:id="rId11"/>
+    <p:sldId id="261" r:id="rId12"/>
+    <p:sldId id="262" r:id="rId13"/>
+    <p:sldId id="264" r:id="rId14"/>
+    <p:sldId id="259" r:id="rId15"/>
   </p:sldIdLst>
   <p:sldSz cx="12192000" cy="6858000"/>
   <p:notesSz cx="6858000" cy="9144000"/>
@@ -6178,416 +6178,6 @@
       </p:grpSpPr>
       <p:sp>
         <p:nvSpPr>
-          <p:cNvPr id="4" name="Rectangle 3">
-            <a:extLst>
-              <a:ext uri="{FF2B5EF4-FFF2-40B4-BE49-F238E27FC236}">
-                <a16:creationId xmlns:a16="http://schemas.microsoft.com/office/drawing/2014/main" id="{C960193E-A476-4B10-95BA-6A9C22CB696A}"/>
-              </a:ext>
-            </a:extLst>
-          </p:cNvPr>
-          <p:cNvSpPr/>
-          <p:nvPr/>
-        </p:nvSpPr>
-        <p:spPr>
-          <a:xfrm>
-            <a:off x="720090" y="182880"/>
-            <a:ext cx="8835390" cy="707886"/>
-          </a:xfrm>
-          <a:prstGeom prst="rect">
-            <a:avLst/>
-          </a:prstGeom>
-        </p:spPr>
-        <p:txBody>
-          <a:bodyPr wrap="square">
-            <a:spAutoFit/>
-          </a:bodyPr>
-          <a:lstStyle/>
-          <a:p>
-            <a:pPr algn="ctr"/>
-            <a:r>
-              <a:rPr lang="en-US" sz="2000" b="1" dirty="0">
-                <a:latin typeface="Calibri" panose="020F0502020204030204" pitchFamily="34" charset="0"/>
-                <a:cs typeface="Calibri" panose="020F0502020204030204" pitchFamily="34" charset="0"/>
-              </a:rPr>
-              <a:t>The Medicare Spending Per Patient</a:t>
-            </a:r>
-          </a:p>
-          <a:p>
-            <a:pPr algn="ctr"/>
-            <a:r>
-              <a:rPr lang="en-US" sz="2000" dirty="0">
-                <a:latin typeface="Calibri" panose="020F0502020204030204" pitchFamily="34" charset="0"/>
-                <a:cs typeface="Calibri" panose="020F0502020204030204" pitchFamily="34" charset="0"/>
-              </a:rPr>
-              <a:t>Medicare spends more, less, or about the same for an episode of care?</a:t>
-            </a:r>
-          </a:p>
-        </p:txBody>
-      </p:sp>
-      <p:pic>
-        <p:nvPicPr>
-          <p:cNvPr id="1026" name="Picture 2">
-            <a:extLst>
-              <a:ext uri="{FF2B5EF4-FFF2-40B4-BE49-F238E27FC236}">
-                <a16:creationId xmlns:a16="http://schemas.microsoft.com/office/drawing/2014/main" id="{77A96258-5A62-408F-AF07-F1075254987A}"/>
-              </a:ext>
-            </a:extLst>
-          </p:cNvPr>
-          <p:cNvPicPr>
-            <a:picLocks noChangeAspect="1" noChangeArrowheads="1"/>
-          </p:cNvPicPr>
-          <p:nvPr/>
-        </p:nvPicPr>
-        <p:blipFill>
-          <a:blip r:embed="rId2">
-            <a:extLst>
-              <a:ext uri="{28A0092B-C50C-407E-A947-70E740481C1C}">
-                <a14:useLocalDpi xmlns:a14="http://schemas.microsoft.com/office/drawing/2010/main" val="0"/>
-              </a:ext>
-            </a:extLst>
-          </a:blip>
-          <a:srcRect/>
-          <a:stretch>
-            <a:fillRect/>
-          </a:stretch>
-        </p:blipFill>
-        <p:spPr bwMode="auto">
-          <a:xfrm>
-            <a:off x="1882140" y="2229353"/>
-            <a:ext cx="6305550" cy="4445767"/>
-          </a:xfrm>
-          <a:prstGeom prst="rect">
-            <a:avLst/>
-          </a:prstGeom>
-          <a:noFill/>
-          <a:extLst>
-            <a:ext uri="{909E8E84-426E-40DD-AFC4-6F175D3DCCD1}">
-              <a14:hiddenFill xmlns:a14="http://schemas.microsoft.com/office/drawing/2010/main">
-                <a:solidFill>
-                  <a:srgbClr val="FFFFFF"/>
-                </a:solidFill>
-              </a14:hiddenFill>
-            </a:ext>
-          </a:extLst>
-        </p:spPr>
-      </p:pic>
-      <p:sp>
-        <p:nvSpPr>
-          <p:cNvPr id="7" name="Content Placeholder 2">
-            <a:extLst>
-              <a:ext uri="{FF2B5EF4-FFF2-40B4-BE49-F238E27FC236}">
-                <a16:creationId xmlns:a16="http://schemas.microsoft.com/office/drawing/2014/main" id="{8D12E0A2-1D9E-4CC8-8E87-26DF6979AD4B}"/>
-              </a:ext>
-            </a:extLst>
-          </p:cNvPr>
-          <p:cNvSpPr txBox="1">
-            <a:spLocks/>
-          </p:cNvSpPr>
-          <p:nvPr/>
-        </p:nvSpPr>
-        <p:spPr>
-          <a:xfrm>
-            <a:off x="2504676" y="1100293"/>
-            <a:ext cx="5562600" cy="707886"/>
-          </a:xfrm>
-          <a:prstGeom prst="rect">
-            <a:avLst/>
-          </a:prstGeom>
-        </p:spPr>
-        <p:txBody>
-          <a:bodyPr vert="horz" lIns="91440" tIns="45720" rIns="91440" bIns="45720" rtlCol="0">
-            <a:normAutofit fontScale="25000" lnSpcReduction="20000"/>
-          </a:bodyPr>
-          <a:lstStyle>
-            <a:lvl1pPr marL="342900" indent="-342900" algn="l" defTabSz="457200" rtl="0" eaLnBrk="1" latinLnBrk="0" hangingPunct="1">
-              <a:spcBef>
-                <a:spcPts val="1000"/>
-              </a:spcBef>
-              <a:spcAft>
-                <a:spcPts val="0"/>
-              </a:spcAft>
-              <a:buClr>
-                <a:schemeClr val="accent1"/>
-              </a:buClr>
-              <a:buSzPct val="80000"/>
-              <a:buFont typeface="Wingdings 3" charset="2"/>
-              <a:buChar char=""/>
-              <a:defRPr sz="1800" kern="1200">
-                <a:solidFill>
-                  <a:schemeClr val="tx1">
-                    <a:lumMod val="75000"/>
-                    <a:lumOff val="25000"/>
-                  </a:schemeClr>
-                </a:solidFill>
-                <a:latin typeface="+mn-lt"/>
-                <a:ea typeface="+mn-ea"/>
-                <a:cs typeface="+mn-cs"/>
-              </a:defRPr>
-            </a:lvl1pPr>
-            <a:lvl2pPr marL="742950" indent="-285750" algn="l" defTabSz="457200" rtl="0" eaLnBrk="1" latinLnBrk="0" hangingPunct="1">
-              <a:spcBef>
-                <a:spcPts val="1000"/>
-              </a:spcBef>
-              <a:spcAft>
-                <a:spcPts val="0"/>
-              </a:spcAft>
-              <a:buClr>
-                <a:schemeClr val="accent1"/>
-              </a:buClr>
-              <a:buSzPct val="80000"/>
-              <a:buFont typeface="Wingdings 3" charset="2"/>
-              <a:buChar char=""/>
-              <a:defRPr sz="1600" kern="1200">
-                <a:solidFill>
-                  <a:schemeClr val="tx1">
-                    <a:lumMod val="75000"/>
-                    <a:lumOff val="25000"/>
-                  </a:schemeClr>
-                </a:solidFill>
-                <a:latin typeface="+mn-lt"/>
-                <a:ea typeface="+mn-ea"/>
-                <a:cs typeface="+mn-cs"/>
-              </a:defRPr>
-            </a:lvl2pPr>
-            <a:lvl3pPr marL="1143000" indent="-228600" algn="l" defTabSz="457200" rtl="0" eaLnBrk="1" latinLnBrk="0" hangingPunct="1">
-              <a:spcBef>
-                <a:spcPts val="1000"/>
-              </a:spcBef>
-              <a:spcAft>
-                <a:spcPts val="0"/>
-              </a:spcAft>
-              <a:buClr>
-                <a:schemeClr val="accent1"/>
-              </a:buClr>
-              <a:buSzPct val="80000"/>
-              <a:buFont typeface="Wingdings 3" charset="2"/>
-              <a:buChar char=""/>
-              <a:defRPr sz="1400" kern="1200">
-                <a:solidFill>
-                  <a:schemeClr val="tx1">
-                    <a:lumMod val="75000"/>
-                    <a:lumOff val="25000"/>
-                  </a:schemeClr>
-                </a:solidFill>
-                <a:latin typeface="+mn-lt"/>
-                <a:ea typeface="+mn-ea"/>
-                <a:cs typeface="+mn-cs"/>
-              </a:defRPr>
-            </a:lvl3pPr>
-            <a:lvl4pPr marL="1600200" indent="-228600" algn="l" defTabSz="457200" rtl="0" eaLnBrk="1" latinLnBrk="0" hangingPunct="1">
-              <a:spcBef>
-                <a:spcPts val="1000"/>
-              </a:spcBef>
-              <a:spcAft>
-                <a:spcPts val="0"/>
-              </a:spcAft>
-              <a:buClr>
-                <a:schemeClr val="accent1"/>
-              </a:buClr>
-              <a:buSzPct val="80000"/>
-              <a:buFont typeface="Wingdings 3" charset="2"/>
-              <a:buChar char=""/>
-              <a:defRPr sz="1200" kern="1200">
-                <a:solidFill>
-                  <a:schemeClr val="tx1">
-                    <a:lumMod val="75000"/>
-                    <a:lumOff val="25000"/>
-                  </a:schemeClr>
-                </a:solidFill>
-                <a:latin typeface="+mn-lt"/>
-                <a:ea typeface="+mn-ea"/>
-                <a:cs typeface="+mn-cs"/>
-              </a:defRPr>
-            </a:lvl4pPr>
-            <a:lvl5pPr marL="2057400" indent="-228600" algn="l" defTabSz="457200" rtl="0" eaLnBrk="1" latinLnBrk="0" hangingPunct="1">
-              <a:spcBef>
-                <a:spcPts val="1000"/>
-              </a:spcBef>
-              <a:spcAft>
-                <a:spcPts val="0"/>
-              </a:spcAft>
-              <a:buClr>
-                <a:schemeClr val="accent1"/>
-              </a:buClr>
-              <a:buSzPct val="80000"/>
-              <a:buFont typeface="Wingdings 3" charset="2"/>
-              <a:buChar char=""/>
-              <a:defRPr sz="1200" kern="1200">
-                <a:solidFill>
-                  <a:schemeClr val="tx1">
-                    <a:lumMod val="75000"/>
-                    <a:lumOff val="25000"/>
-                  </a:schemeClr>
-                </a:solidFill>
-                <a:latin typeface="+mn-lt"/>
-                <a:ea typeface="+mn-ea"/>
-                <a:cs typeface="+mn-cs"/>
-              </a:defRPr>
-            </a:lvl5pPr>
-            <a:lvl6pPr marL="2514600" indent="-228600" algn="l" defTabSz="457200" rtl="0" eaLnBrk="1" latinLnBrk="0" hangingPunct="1">
-              <a:spcBef>
-                <a:spcPts val="1000"/>
-              </a:spcBef>
-              <a:spcAft>
-                <a:spcPts val="0"/>
-              </a:spcAft>
-              <a:buClr>
-                <a:schemeClr val="accent1"/>
-              </a:buClr>
-              <a:buSzPct val="80000"/>
-              <a:buFont typeface="Wingdings 3" charset="2"/>
-              <a:buChar char=""/>
-              <a:defRPr sz="1200" kern="1200">
-                <a:solidFill>
-                  <a:schemeClr val="tx1">
-                    <a:lumMod val="75000"/>
-                    <a:lumOff val="25000"/>
-                  </a:schemeClr>
-                </a:solidFill>
-                <a:latin typeface="+mn-lt"/>
-                <a:ea typeface="+mn-ea"/>
-                <a:cs typeface="+mn-cs"/>
-              </a:defRPr>
-            </a:lvl6pPr>
-            <a:lvl7pPr marL="2971800" indent="-228600" algn="l" defTabSz="457200" rtl="0" eaLnBrk="1" latinLnBrk="0" hangingPunct="1">
-              <a:spcBef>
-                <a:spcPts val="1000"/>
-              </a:spcBef>
-              <a:spcAft>
-                <a:spcPts val="0"/>
-              </a:spcAft>
-              <a:buClr>
-                <a:schemeClr val="accent1"/>
-              </a:buClr>
-              <a:buSzPct val="80000"/>
-              <a:buFont typeface="Wingdings 3" charset="2"/>
-              <a:buChar char=""/>
-              <a:defRPr sz="1200" kern="1200">
-                <a:solidFill>
-                  <a:schemeClr val="tx1">
-                    <a:lumMod val="75000"/>
-                    <a:lumOff val="25000"/>
-                  </a:schemeClr>
-                </a:solidFill>
-                <a:latin typeface="+mn-lt"/>
-                <a:ea typeface="+mn-ea"/>
-                <a:cs typeface="+mn-cs"/>
-              </a:defRPr>
-            </a:lvl7pPr>
-            <a:lvl8pPr marL="3429000" indent="-228600" algn="l" defTabSz="457200" rtl="0" eaLnBrk="1" latinLnBrk="0" hangingPunct="1">
-              <a:spcBef>
-                <a:spcPts val="1000"/>
-              </a:spcBef>
-              <a:spcAft>
-                <a:spcPts val="0"/>
-              </a:spcAft>
-              <a:buClr>
-                <a:schemeClr val="accent1"/>
-              </a:buClr>
-              <a:buSzPct val="80000"/>
-              <a:buFont typeface="Wingdings 3" charset="2"/>
-              <a:buChar char=""/>
-              <a:defRPr sz="1200" kern="1200">
-                <a:solidFill>
-                  <a:schemeClr val="tx1">
-                    <a:lumMod val="75000"/>
-                    <a:lumOff val="25000"/>
-                  </a:schemeClr>
-                </a:solidFill>
-                <a:latin typeface="+mn-lt"/>
-                <a:ea typeface="+mn-ea"/>
-                <a:cs typeface="+mn-cs"/>
-              </a:defRPr>
-            </a:lvl8pPr>
-            <a:lvl9pPr marL="3886200" indent="-228600" algn="l" defTabSz="457200" rtl="0" eaLnBrk="1" latinLnBrk="0" hangingPunct="1">
-              <a:spcBef>
-                <a:spcPts val="1000"/>
-              </a:spcBef>
-              <a:spcAft>
-                <a:spcPts val="0"/>
-              </a:spcAft>
-              <a:buClr>
-                <a:schemeClr val="accent1"/>
-              </a:buClr>
-              <a:buSzPct val="80000"/>
-              <a:buFont typeface="Wingdings 3" charset="2"/>
-              <a:buChar char=""/>
-              <a:defRPr sz="1200" kern="1200">
-                <a:solidFill>
-                  <a:schemeClr val="tx1">
-                    <a:lumMod val="75000"/>
-                    <a:lumOff val="25000"/>
-                  </a:schemeClr>
-                </a:solidFill>
-                <a:latin typeface="+mn-lt"/>
-                <a:ea typeface="+mn-ea"/>
-                <a:cs typeface="+mn-cs"/>
-              </a:defRPr>
-            </a:lvl9pPr>
-          </a:lstStyle>
-          <a:p>
-            <a:r>
-              <a:rPr lang="en-US" sz="8000" dirty="0"/>
-              <a:t>Based on the average score per county:</a:t>
-            </a:r>
-          </a:p>
-          <a:p>
-            <a:pPr lvl="1"/>
-            <a:r>
-              <a:rPr lang="en-US" sz="8000" dirty="0"/>
-              <a:t>Johnson County spends more</a:t>
-            </a:r>
-          </a:p>
-          <a:p>
-            <a:pPr marL="0" indent="0">
-              <a:buNone/>
-            </a:pPr>
-            <a:r>
-              <a:rPr lang="en-US" dirty="0"/>
-              <a:t>	</a:t>
-            </a:r>
-            <a:endParaRPr lang="en-US" sz="6400" dirty="0"/>
-          </a:p>
-          <a:p>
-            <a:pPr marL="0" indent="0">
-              <a:buNone/>
-            </a:pPr>
-            <a:endParaRPr lang="en-US" sz="9600" dirty="0"/>
-          </a:p>
-        </p:txBody>
-      </p:sp>
-    </p:spTree>
-    <p:extLst>
-      <p:ext uri="{BB962C8B-B14F-4D97-AF65-F5344CB8AC3E}">
-        <p14:creationId xmlns:p14="http://schemas.microsoft.com/office/powerpoint/2010/main" val="2635635244"/>
-      </p:ext>
-    </p:extLst>
-  </p:cSld>
-  <p:clrMapOvr>
-    <a:masterClrMapping/>
-  </p:clrMapOvr>
-</p:sld>
-</file>
-
-<file path=ppt/slides/slide11.xml><?xml version="1.0" encoding="utf-8"?>
-<p:sld xmlns:a="http://schemas.openxmlformats.org/drawingml/2006/main" xmlns:r="http://schemas.openxmlformats.org/officeDocument/2006/relationships" xmlns:p="http://schemas.openxmlformats.org/presentationml/2006/main">
-  <p:cSld>
-    <p:spTree>
-      <p:nvGrpSpPr>
-        <p:cNvPr id="1" name=""/>
-        <p:cNvGrpSpPr/>
-        <p:nvPr/>
-      </p:nvGrpSpPr>
-      <p:grpSpPr>
-        <a:xfrm>
-          <a:off x="0" y="0"/>
-          <a:ext cx="0" cy="0"/>
-          <a:chOff x="0" y="0"/>
-          <a:chExt cx="0" cy="0"/>
-        </a:xfrm>
-      </p:grpSpPr>
-      <p:sp>
-        <p:nvSpPr>
           <p:cNvPr id="2" name="Title 1">
             <a:extLst>
               <a:ext uri="{FF2B5EF4-FFF2-40B4-BE49-F238E27FC236}">
@@ -6682,7 +6272,7 @@
 </p:sld>
 </file>
 
-<file path=ppt/slides/slide12.xml><?xml version="1.0" encoding="utf-8"?>
+<file path=ppt/slides/slide11.xml><?xml version="1.0" encoding="utf-8"?>
 <p:sld xmlns:a="http://schemas.openxmlformats.org/drawingml/2006/main" xmlns:r="http://schemas.openxmlformats.org/officeDocument/2006/relationships" xmlns:p="http://schemas.openxmlformats.org/presentationml/2006/main">
   <p:cSld>
     <p:spTree>
@@ -6787,8 +6377,8 @@
         </p:blipFill>
         <p:spPr>
           <a:xfrm>
-            <a:off x="2232194" y="2272090"/>
-            <a:ext cx="5487650" cy="3658433"/>
+            <a:off x="2079794" y="2227817"/>
+            <a:ext cx="6260642" cy="4173761"/>
           </a:xfrm>
         </p:spPr>
       </p:pic>
@@ -6805,7 +6395,7 @@
 </p:sld>
 </file>
 
-<file path=ppt/slides/slide13.xml><?xml version="1.0" encoding="utf-8"?>
+<file path=ppt/slides/slide12.xml><?xml version="1.0" encoding="utf-8"?>
 <p:sld xmlns:a="http://schemas.openxmlformats.org/drawingml/2006/main" xmlns:r="http://schemas.openxmlformats.org/officeDocument/2006/relationships" xmlns:p="http://schemas.openxmlformats.org/presentationml/2006/main">
   <p:cSld>
     <p:spTree>
@@ -6912,7 +6502,7 @@
 </p:sld>
 </file>
 
-<file path=ppt/slides/slide14.xml><?xml version="1.0" encoding="utf-8"?>
+<file path=ppt/slides/slide13.xml><?xml version="1.0" encoding="utf-8"?>
 <p:sld xmlns:a="http://schemas.openxmlformats.org/drawingml/2006/main" xmlns:r="http://schemas.openxmlformats.org/officeDocument/2006/relationships" xmlns:p="http://schemas.openxmlformats.org/presentationml/2006/main">
   <p:cSld>
     <p:spTree>
@@ -7049,6 +6639,124 @@
     <p:extLst>
       <p:ext uri="{BB962C8B-B14F-4D97-AF65-F5344CB8AC3E}">
         <p14:creationId xmlns:p14="http://schemas.microsoft.com/office/powerpoint/2010/main" val="1415604396"/>
+      </p:ext>
+    </p:extLst>
+  </p:cSld>
+  <p:clrMapOvr>
+    <a:masterClrMapping/>
+  </p:clrMapOvr>
+</p:sld>
+</file>
+
+<file path=ppt/slides/slide14.xml><?xml version="1.0" encoding="utf-8"?>
+<p:sld xmlns:a="http://schemas.openxmlformats.org/drawingml/2006/main" xmlns:r="http://schemas.openxmlformats.org/officeDocument/2006/relationships" xmlns:p="http://schemas.openxmlformats.org/presentationml/2006/main">
+  <p:cSld>
+    <p:spTree>
+      <p:nvGrpSpPr>
+        <p:cNvPr id="1" name=""/>
+        <p:cNvGrpSpPr/>
+        <p:nvPr/>
+      </p:nvGrpSpPr>
+      <p:grpSpPr>
+        <a:xfrm>
+          <a:off x="0" y="0"/>
+          <a:ext cx="0" cy="0"/>
+          <a:chOff x="0" y="0"/>
+          <a:chExt cx="0" cy="0"/>
+        </a:xfrm>
+      </p:grpSpPr>
+      <p:sp>
+        <p:nvSpPr>
+          <p:cNvPr id="2" name="Title 1">
+            <a:extLst>
+              <a:ext uri="{FF2B5EF4-FFF2-40B4-BE49-F238E27FC236}">
+                <a16:creationId xmlns:a16="http://schemas.microsoft.com/office/drawing/2014/main" id="{9E04E921-6E2A-471E-8FA1-A7C9E4246B39}"/>
+              </a:ext>
+            </a:extLst>
+          </p:cNvPr>
+          <p:cNvSpPr>
+            <a:spLocks noGrp="1"/>
+          </p:cNvSpPr>
+          <p:nvPr>
+            <p:ph type="title"/>
+          </p:nvPr>
+        </p:nvSpPr>
+        <p:spPr>
+          <a:xfrm>
+            <a:off x="838200" y="791254"/>
+            <a:ext cx="10515600" cy="1325563"/>
+          </a:xfrm>
+        </p:spPr>
+        <p:txBody>
+          <a:bodyPr>
+            <a:normAutofit fontScale="90000"/>
+          </a:bodyPr>
+          <a:lstStyle/>
+          <a:p>
+            <a:r>
+              <a:rPr lang="en-US" dirty="0">
+                <a:latin typeface="Calibri" panose="020F0502020204030204" pitchFamily="34" charset="0"/>
+                <a:cs typeface="Calibri" panose="020F0502020204030204" pitchFamily="34" charset="0"/>
+              </a:rPr>
+              <a:t>Question 2: </a:t>
+            </a:r>
+            <a:r>
+              <a:rPr lang="en-US" dirty="0">
+                <a:solidFill>
+                  <a:schemeClr val="tx1"/>
+                </a:solidFill>
+                <a:latin typeface="Calibri" panose="020F0502020204030204" pitchFamily="34" charset="0"/>
+                <a:cs typeface="Calibri" panose="020F0502020204030204" pitchFamily="34" charset="0"/>
+              </a:rPr>
+              <a:t>If hospitals within a county have consistent Medicare spending, then they should have Fewer readmissions.</a:t>
+            </a:r>
+            <a:br>
+              <a:rPr lang="en-US" dirty="0">
+                <a:latin typeface="Calibri" panose="020F0502020204030204" pitchFamily="34" charset="0"/>
+                <a:cs typeface="Calibri" panose="020F0502020204030204" pitchFamily="34" charset="0"/>
+              </a:rPr>
+            </a:br>
+            <a:endParaRPr lang="en-US" dirty="0">
+              <a:latin typeface="Calibri" panose="020F0502020204030204" pitchFamily="34" charset="0"/>
+              <a:cs typeface="Calibri" panose="020F0502020204030204" pitchFamily="34" charset="0"/>
+            </a:endParaRPr>
+          </a:p>
+        </p:txBody>
+      </p:sp>
+      <p:sp>
+        <p:nvSpPr>
+          <p:cNvPr id="3" name="Content Placeholder 2">
+            <a:extLst>
+              <a:ext uri="{FF2B5EF4-FFF2-40B4-BE49-F238E27FC236}">
+                <a16:creationId xmlns:a16="http://schemas.microsoft.com/office/drawing/2014/main" id="{1CF0FAC3-A729-405E-B050-AD598AE25214}"/>
+              </a:ext>
+            </a:extLst>
+          </p:cNvPr>
+          <p:cNvSpPr>
+            <a:spLocks noGrp="1"/>
+          </p:cNvSpPr>
+          <p:nvPr>
+            <p:ph idx="1"/>
+          </p:nvPr>
+        </p:nvSpPr>
+        <p:spPr>
+          <a:xfrm>
+            <a:off x="838200" y="2423603"/>
+            <a:ext cx="10515600" cy="3753359"/>
+          </a:xfrm>
+        </p:spPr>
+        <p:txBody>
+          <a:bodyPr/>
+          <a:lstStyle/>
+          <a:p>
+            <a:endParaRPr lang="en-US" dirty="0"/>
+          </a:p>
+        </p:txBody>
+      </p:sp>
+    </p:spTree>
+    <p:extLst>
+      <p:ext uri="{BB962C8B-B14F-4D97-AF65-F5344CB8AC3E}">
+        <p14:creationId xmlns:p14="http://schemas.microsoft.com/office/powerpoint/2010/main" val="524358472"/>
       </p:ext>
     </p:extLst>
   </p:cSld>
@@ -12761,96 +12469,388 @@
       </p:grpSpPr>
       <p:sp>
         <p:nvSpPr>
-          <p:cNvPr id="2" name="Title 1">
+          <p:cNvPr id="4" name="Rectangle 3">
             <a:extLst>
               <a:ext uri="{FF2B5EF4-FFF2-40B4-BE49-F238E27FC236}">
-                <a16:creationId xmlns:a16="http://schemas.microsoft.com/office/drawing/2014/main" id="{9E04E921-6E2A-471E-8FA1-A7C9E4246B39}"/>
+                <a16:creationId xmlns:a16="http://schemas.microsoft.com/office/drawing/2014/main" id="{C960193E-A476-4B10-95BA-6A9C22CB696A}"/>
               </a:ext>
             </a:extLst>
           </p:cNvPr>
-          <p:cNvSpPr>
-            <a:spLocks noGrp="1"/>
-          </p:cNvSpPr>
-          <p:nvPr>
-            <p:ph type="title"/>
-          </p:nvPr>
+          <p:cNvSpPr/>
+          <p:nvPr/>
         </p:nvSpPr>
         <p:spPr>
           <a:xfrm>
-            <a:off x="838200" y="791254"/>
-            <a:ext cx="10515600" cy="1325563"/>
+            <a:off x="720090" y="182880"/>
+            <a:ext cx="8835390" cy="707886"/>
           </a:xfrm>
+          <a:prstGeom prst="rect">
+            <a:avLst/>
+          </a:prstGeom>
         </p:spPr>
         <p:txBody>
-          <a:bodyPr>
-            <a:normAutofit fontScale="90000"/>
+          <a:bodyPr wrap="square">
+            <a:spAutoFit/>
           </a:bodyPr>
           <a:lstStyle/>
           <a:p>
-            <a:r>
-              <a:rPr lang="en-US" dirty="0">
+            <a:pPr algn="ctr"/>
+            <a:r>
+              <a:rPr lang="en-US" sz="2000" b="1" dirty="0">
                 <a:latin typeface="Calibri" panose="020F0502020204030204" pitchFamily="34" charset="0"/>
                 <a:cs typeface="Calibri" panose="020F0502020204030204" pitchFamily="34" charset="0"/>
               </a:rPr>
-              <a:t>Question 2: </a:t>
-            </a:r>
-            <a:r>
-              <a:rPr lang="en-US" dirty="0">
-                <a:solidFill>
-                  <a:schemeClr val="tx1"/>
-                </a:solidFill>
+              <a:t>The Medicare Spending Per Patient</a:t>
+            </a:r>
+          </a:p>
+          <a:p>
+            <a:pPr algn="ctr"/>
+            <a:r>
+              <a:rPr lang="en-US" sz="2000" dirty="0">
                 <a:latin typeface="Calibri" panose="020F0502020204030204" pitchFamily="34" charset="0"/>
                 <a:cs typeface="Calibri" panose="020F0502020204030204" pitchFamily="34" charset="0"/>
               </a:rPr>
-              <a:t>If hospitals within a county have consistent Medicare spending, then they should have Fewer readmissions.</a:t>
-            </a:r>
-            <a:br>
-              <a:rPr lang="en-US" dirty="0">
-                <a:latin typeface="Calibri" panose="020F0502020204030204" pitchFamily="34" charset="0"/>
-                <a:cs typeface="Calibri" panose="020F0502020204030204" pitchFamily="34" charset="0"/>
-              </a:rPr>
-            </a:br>
-            <a:endParaRPr lang="en-US" dirty="0">
-              <a:latin typeface="Calibri" panose="020F0502020204030204" pitchFamily="34" charset="0"/>
-              <a:cs typeface="Calibri" panose="020F0502020204030204" pitchFamily="34" charset="0"/>
-            </a:endParaRPr>
+              <a:t>Medicare spends more, less, or about the same for an episode of care?</a:t>
+            </a:r>
           </a:p>
         </p:txBody>
       </p:sp>
-      <p:sp>
-        <p:nvSpPr>
-          <p:cNvPr id="3" name="Content Placeholder 2">
+      <p:pic>
+        <p:nvPicPr>
+          <p:cNvPr id="1026" name="Picture 2">
             <a:extLst>
               <a:ext uri="{FF2B5EF4-FFF2-40B4-BE49-F238E27FC236}">
-                <a16:creationId xmlns:a16="http://schemas.microsoft.com/office/drawing/2014/main" id="{1CF0FAC3-A729-405E-B050-AD598AE25214}"/>
+                <a16:creationId xmlns:a16="http://schemas.microsoft.com/office/drawing/2014/main" id="{77A96258-5A62-408F-AF07-F1075254987A}"/>
               </a:ext>
             </a:extLst>
           </p:cNvPr>
-          <p:cNvSpPr>
-            <a:spLocks noGrp="1"/>
+          <p:cNvPicPr>
+            <a:picLocks noChangeAspect="1" noChangeArrowheads="1"/>
+          </p:cNvPicPr>
+          <p:nvPr/>
+        </p:nvPicPr>
+        <p:blipFill>
+          <a:blip r:embed="rId2">
+            <a:extLst>
+              <a:ext uri="{28A0092B-C50C-407E-A947-70E740481C1C}">
+                <a14:useLocalDpi xmlns:a14="http://schemas.microsoft.com/office/drawing/2010/main" val="0"/>
+              </a:ext>
+            </a:extLst>
+          </a:blip>
+          <a:srcRect/>
+          <a:stretch>
+            <a:fillRect/>
+          </a:stretch>
+        </p:blipFill>
+        <p:spPr bwMode="auto">
+          <a:xfrm>
+            <a:off x="1882140" y="2229353"/>
+            <a:ext cx="6305550" cy="4445767"/>
+          </a:xfrm>
+          <a:prstGeom prst="rect">
+            <a:avLst/>
+          </a:prstGeom>
+          <a:noFill/>
+          <a:extLst>
+            <a:ext uri="{909E8E84-426E-40DD-AFC4-6F175D3DCCD1}">
+              <a14:hiddenFill xmlns:a14="http://schemas.microsoft.com/office/drawing/2010/main">
+                <a:solidFill>
+                  <a:srgbClr val="FFFFFF"/>
+                </a:solidFill>
+              </a14:hiddenFill>
+            </a:ext>
+          </a:extLst>
+        </p:spPr>
+      </p:pic>
+      <p:sp>
+        <p:nvSpPr>
+          <p:cNvPr id="7" name="Content Placeholder 2">
+            <a:extLst>
+              <a:ext uri="{FF2B5EF4-FFF2-40B4-BE49-F238E27FC236}">
+                <a16:creationId xmlns:a16="http://schemas.microsoft.com/office/drawing/2014/main" id="{8D12E0A2-1D9E-4CC8-8E87-26DF6979AD4B}"/>
+              </a:ext>
+            </a:extLst>
+          </p:cNvPr>
+          <p:cNvSpPr txBox="1">
+            <a:spLocks/>
           </p:cNvSpPr>
-          <p:nvPr>
-            <p:ph idx="1"/>
-          </p:nvPr>
+          <p:nvPr/>
         </p:nvSpPr>
         <p:spPr>
           <a:xfrm>
-            <a:off x="838200" y="2423603"/>
-            <a:ext cx="10515600" cy="3753359"/>
+            <a:off x="2504676" y="1100293"/>
+            <a:ext cx="5562600" cy="707886"/>
           </a:xfrm>
+          <a:prstGeom prst="rect">
+            <a:avLst/>
+          </a:prstGeom>
         </p:spPr>
         <p:txBody>
-          <a:bodyPr/>
-          <a:lstStyle/>
-          <a:p>
-            <a:endParaRPr lang="en-US" dirty="0"/>
+          <a:bodyPr vert="horz" lIns="91440" tIns="45720" rIns="91440" bIns="45720" rtlCol="0">
+            <a:normAutofit fontScale="25000" lnSpcReduction="20000"/>
+          </a:bodyPr>
+          <a:lstStyle>
+            <a:lvl1pPr marL="342900" indent="-342900" algn="l" defTabSz="457200" rtl="0" eaLnBrk="1" latinLnBrk="0" hangingPunct="1">
+              <a:spcBef>
+                <a:spcPts val="1000"/>
+              </a:spcBef>
+              <a:spcAft>
+                <a:spcPts val="0"/>
+              </a:spcAft>
+              <a:buClr>
+                <a:schemeClr val="accent1"/>
+              </a:buClr>
+              <a:buSzPct val="80000"/>
+              <a:buFont typeface="Wingdings 3" charset="2"/>
+              <a:buChar char=""/>
+              <a:defRPr sz="1800" kern="1200">
+                <a:solidFill>
+                  <a:schemeClr val="tx1">
+                    <a:lumMod val="75000"/>
+                    <a:lumOff val="25000"/>
+                  </a:schemeClr>
+                </a:solidFill>
+                <a:latin typeface="+mn-lt"/>
+                <a:ea typeface="+mn-ea"/>
+                <a:cs typeface="+mn-cs"/>
+              </a:defRPr>
+            </a:lvl1pPr>
+            <a:lvl2pPr marL="742950" indent="-285750" algn="l" defTabSz="457200" rtl="0" eaLnBrk="1" latinLnBrk="0" hangingPunct="1">
+              <a:spcBef>
+                <a:spcPts val="1000"/>
+              </a:spcBef>
+              <a:spcAft>
+                <a:spcPts val="0"/>
+              </a:spcAft>
+              <a:buClr>
+                <a:schemeClr val="accent1"/>
+              </a:buClr>
+              <a:buSzPct val="80000"/>
+              <a:buFont typeface="Wingdings 3" charset="2"/>
+              <a:buChar char=""/>
+              <a:defRPr sz="1600" kern="1200">
+                <a:solidFill>
+                  <a:schemeClr val="tx1">
+                    <a:lumMod val="75000"/>
+                    <a:lumOff val="25000"/>
+                  </a:schemeClr>
+                </a:solidFill>
+                <a:latin typeface="+mn-lt"/>
+                <a:ea typeface="+mn-ea"/>
+                <a:cs typeface="+mn-cs"/>
+              </a:defRPr>
+            </a:lvl2pPr>
+            <a:lvl3pPr marL="1143000" indent="-228600" algn="l" defTabSz="457200" rtl="0" eaLnBrk="1" latinLnBrk="0" hangingPunct="1">
+              <a:spcBef>
+                <a:spcPts val="1000"/>
+              </a:spcBef>
+              <a:spcAft>
+                <a:spcPts val="0"/>
+              </a:spcAft>
+              <a:buClr>
+                <a:schemeClr val="accent1"/>
+              </a:buClr>
+              <a:buSzPct val="80000"/>
+              <a:buFont typeface="Wingdings 3" charset="2"/>
+              <a:buChar char=""/>
+              <a:defRPr sz="1400" kern="1200">
+                <a:solidFill>
+                  <a:schemeClr val="tx1">
+                    <a:lumMod val="75000"/>
+                    <a:lumOff val="25000"/>
+                  </a:schemeClr>
+                </a:solidFill>
+                <a:latin typeface="+mn-lt"/>
+                <a:ea typeface="+mn-ea"/>
+                <a:cs typeface="+mn-cs"/>
+              </a:defRPr>
+            </a:lvl3pPr>
+            <a:lvl4pPr marL="1600200" indent="-228600" algn="l" defTabSz="457200" rtl="0" eaLnBrk="1" latinLnBrk="0" hangingPunct="1">
+              <a:spcBef>
+                <a:spcPts val="1000"/>
+              </a:spcBef>
+              <a:spcAft>
+                <a:spcPts val="0"/>
+              </a:spcAft>
+              <a:buClr>
+                <a:schemeClr val="accent1"/>
+              </a:buClr>
+              <a:buSzPct val="80000"/>
+              <a:buFont typeface="Wingdings 3" charset="2"/>
+              <a:buChar char=""/>
+              <a:defRPr sz="1200" kern="1200">
+                <a:solidFill>
+                  <a:schemeClr val="tx1">
+                    <a:lumMod val="75000"/>
+                    <a:lumOff val="25000"/>
+                  </a:schemeClr>
+                </a:solidFill>
+                <a:latin typeface="+mn-lt"/>
+                <a:ea typeface="+mn-ea"/>
+                <a:cs typeface="+mn-cs"/>
+              </a:defRPr>
+            </a:lvl4pPr>
+            <a:lvl5pPr marL="2057400" indent="-228600" algn="l" defTabSz="457200" rtl="0" eaLnBrk="1" latinLnBrk="0" hangingPunct="1">
+              <a:spcBef>
+                <a:spcPts val="1000"/>
+              </a:spcBef>
+              <a:spcAft>
+                <a:spcPts val="0"/>
+              </a:spcAft>
+              <a:buClr>
+                <a:schemeClr val="accent1"/>
+              </a:buClr>
+              <a:buSzPct val="80000"/>
+              <a:buFont typeface="Wingdings 3" charset="2"/>
+              <a:buChar char=""/>
+              <a:defRPr sz="1200" kern="1200">
+                <a:solidFill>
+                  <a:schemeClr val="tx1">
+                    <a:lumMod val="75000"/>
+                    <a:lumOff val="25000"/>
+                  </a:schemeClr>
+                </a:solidFill>
+                <a:latin typeface="+mn-lt"/>
+                <a:ea typeface="+mn-ea"/>
+                <a:cs typeface="+mn-cs"/>
+              </a:defRPr>
+            </a:lvl5pPr>
+            <a:lvl6pPr marL="2514600" indent="-228600" algn="l" defTabSz="457200" rtl="0" eaLnBrk="1" latinLnBrk="0" hangingPunct="1">
+              <a:spcBef>
+                <a:spcPts val="1000"/>
+              </a:spcBef>
+              <a:spcAft>
+                <a:spcPts val="0"/>
+              </a:spcAft>
+              <a:buClr>
+                <a:schemeClr val="accent1"/>
+              </a:buClr>
+              <a:buSzPct val="80000"/>
+              <a:buFont typeface="Wingdings 3" charset="2"/>
+              <a:buChar char=""/>
+              <a:defRPr sz="1200" kern="1200">
+                <a:solidFill>
+                  <a:schemeClr val="tx1">
+                    <a:lumMod val="75000"/>
+                    <a:lumOff val="25000"/>
+                  </a:schemeClr>
+                </a:solidFill>
+                <a:latin typeface="+mn-lt"/>
+                <a:ea typeface="+mn-ea"/>
+                <a:cs typeface="+mn-cs"/>
+              </a:defRPr>
+            </a:lvl6pPr>
+            <a:lvl7pPr marL="2971800" indent="-228600" algn="l" defTabSz="457200" rtl="0" eaLnBrk="1" latinLnBrk="0" hangingPunct="1">
+              <a:spcBef>
+                <a:spcPts val="1000"/>
+              </a:spcBef>
+              <a:spcAft>
+                <a:spcPts val="0"/>
+              </a:spcAft>
+              <a:buClr>
+                <a:schemeClr val="accent1"/>
+              </a:buClr>
+              <a:buSzPct val="80000"/>
+              <a:buFont typeface="Wingdings 3" charset="2"/>
+              <a:buChar char=""/>
+              <a:defRPr sz="1200" kern="1200">
+                <a:solidFill>
+                  <a:schemeClr val="tx1">
+                    <a:lumMod val="75000"/>
+                    <a:lumOff val="25000"/>
+                  </a:schemeClr>
+                </a:solidFill>
+                <a:latin typeface="+mn-lt"/>
+                <a:ea typeface="+mn-ea"/>
+                <a:cs typeface="+mn-cs"/>
+              </a:defRPr>
+            </a:lvl7pPr>
+            <a:lvl8pPr marL="3429000" indent="-228600" algn="l" defTabSz="457200" rtl="0" eaLnBrk="1" latinLnBrk="0" hangingPunct="1">
+              <a:spcBef>
+                <a:spcPts val="1000"/>
+              </a:spcBef>
+              <a:spcAft>
+                <a:spcPts val="0"/>
+              </a:spcAft>
+              <a:buClr>
+                <a:schemeClr val="accent1"/>
+              </a:buClr>
+              <a:buSzPct val="80000"/>
+              <a:buFont typeface="Wingdings 3" charset="2"/>
+              <a:buChar char=""/>
+              <a:defRPr sz="1200" kern="1200">
+                <a:solidFill>
+                  <a:schemeClr val="tx1">
+                    <a:lumMod val="75000"/>
+                    <a:lumOff val="25000"/>
+                  </a:schemeClr>
+                </a:solidFill>
+                <a:latin typeface="+mn-lt"/>
+                <a:ea typeface="+mn-ea"/>
+                <a:cs typeface="+mn-cs"/>
+              </a:defRPr>
+            </a:lvl8pPr>
+            <a:lvl9pPr marL="3886200" indent="-228600" algn="l" defTabSz="457200" rtl="0" eaLnBrk="1" latinLnBrk="0" hangingPunct="1">
+              <a:spcBef>
+                <a:spcPts val="1000"/>
+              </a:spcBef>
+              <a:spcAft>
+                <a:spcPts val="0"/>
+              </a:spcAft>
+              <a:buClr>
+                <a:schemeClr val="accent1"/>
+              </a:buClr>
+              <a:buSzPct val="80000"/>
+              <a:buFont typeface="Wingdings 3" charset="2"/>
+              <a:buChar char=""/>
+              <a:defRPr sz="1200" kern="1200">
+                <a:solidFill>
+                  <a:schemeClr val="tx1">
+                    <a:lumMod val="75000"/>
+                    <a:lumOff val="25000"/>
+                  </a:schemeClr>
+                </a:solidFill>
+                <a:latin typeface="+mn-lt"/>
+                <a:ea typeface="+mn-ea"/>
+                <a:cs typeface="+mn-cs"/>
+              </a:defRPr>
+            </a:lvl9pPr>
+          </a:lstStyle>
+          <a:p>
+            <a:r>
+              <a:rPr lang="en-US" sz="8000" dirty="0"/>
+              <a:t>Based on the average score per county:</a:t>
+            </a:r>
+          </a:p>
+          <a:p>
+            <a:pPr lvl="1"/>
+            <a:r>
+              <a:rPr lang="en-US" sz="8000" dirty="0"/>
+              <a:t>Johnson County spends more</a:t>
+            </a:r>
+          </a:p>
+          <a:p>
+            <a:pPr marL="0" indent="0">
+              <a:buNone/>
+            </a:pPr>
+            <a:r>
+              <a:rPr lang="en-US" dirty="0"/>
+              <a:t>	</a:t>
+            </a:r>
+            <a:endParaRPr lang="en-US" sz="6400" dirty="0"/>
+          </a:p>
+          <a:p>
+            <a:pPr marL="0" indent="0">
+              <a:buNone/>
+            </a:pPr>
+            <a:endParaRPr lang="en-US" sz="9600" dirty="0"/>
           </a:p>
         </p:txBody>
       </p:sp>
     </p:spTree>
     <p:extLst>
       <p:ext uri="{BB962C8B-B14F-4D97-AF65-F5344CB8AC3E}">
-        <p14:creationId xmlns:p14="http://schemas.microsoft.com/office/powerpoint/2010/main" val="524358472"/>
+        <p14:creationId xmlns:p14="http://schemas.microsoft.com/office/powerpoint/2010/main" val="2635635244"/>
       </p:ext>
     </p:extLst>
   </p:cSld>

</xml_diff>